<commit_message>
increase font size in flow diagram
</commit_message>
<xml_diff>
--- a/Figures/diagrams.pptx
+++ b/Figures/diagrams.pptx
@@ -104,6 +104,11 @@
       </a:defRPr>
     </a:lvl9pPr>
   </p:defaultTextStyle>
+  <p:extLst>
+    <p:ext uri="{EFAFB233-063F-42B5-8137-9DF3F51BA10A}">
+      <p15:sldGuideLst xmlns:p15="http://schemas.microsoft.com/office/powerpoint/2012/main"/>
+    </p:ext>
+  </p:extLst>
 </p:presentation>
 </file>
 
@@ -884,7 +889,7 @@
         <a:p>
           <a:pPr rtl="0"/>
           <a:r>
-            <a:rPr lang="en-US" sz="1600" dirty="0">
+            <a:rPr lang="en-US" sz="2000" dirty="0">
               <a:solidFill>
                 <a:schemeClr val="tx1">
                   <a:lumMod val="50000"/>
@@ -900,7 +905,7 @@
         <a:p>
           <a:pPr rtl="0"/>
           <a:r>
-            <a:rPr lang="en-US" sz="1600" dirty="0">
+            <a:rPr lang="en-US" sz="2000" dirty="0">
               <a:solidFill>
                 <a:schemeClr val="tx1">
                   <a:lumMod val="50000"/>
@@ -916,7 +921,7 @@
         <a:p>
           <a:pPr rtl="0"/>
           <a:r>
-            <a:rPr lang="en-US" sz="1600" dirty="0">
+            <a:rPr lang="en-US" sz="2000" dirty="0">
               <a:solidFill>
                 <a:schemeClr val="tx1">
                   <a:lumMod val="50000"/>
@@ -968,7 +973,7 @@
         <a:lstStyle/>
         <a:p>
           <a:r>
-            <a:rPr lang="en-US" sz="1600" dirty="0">
+            <a:rPr lang="en-US" sz="2000" dirty="0">
               <a:solidFill>
                 <a:schemeClr val="tx1">
                   <a:lumMod val="50000"/>
@@ -983,7 +988,7 @@
         </a:p>
         <a:p>
           <a:r>
-            <a:rPr lang="en-US" sz="1600" dirty="0">
+            <a:rPr lang="en-US" sz="2000" dirty="0">
               <a:solidFill>
                 <a:schemeClr val="tx1">
                   <a:lumMod val="50000"/>
@@ -995,7 +1000,7 @@
             </a:rPr>
             <a:t>N = 13</a:t>
           </a:r>
-          <a:endParaRPr lang="en-US" sz="1600" dirty="0"/>
+          <a:endParaRPr lang="en-US" sz="2000" dirty="0"/>
         </a:p>
       </dgm:t>
     </dgm:pt>
@@ -1043,7 +1048,7 @@
         <a:p>
           <a:pPr rtl="0"/>
           <a:r>
-            <a:rPr lang="en-US" sz="1600" dirty="0">
+            <a:rPr lang="en-US" sz="2000" dirty="0">
               <a:solidFill>
                 <a:schemeClr val="tx1">
                   <a:lumMod val="50000"/>
@@ -1059,7 +1064,7 @@
         <a:p>
           <a:pPr rtl="0"/>
           <a:r>
-            <a:rPr lang="en-US" sz="1600" dirty="0">
+            <a:rPr lang="en-US" sz="2000" dirty="0">
               <a:solidFill>
                 <a:schemeClr val="tx1">
                   <a:lumMod val="50000"/>
@@ -1432,12 +1437,12 @@
         </a:fontRef>
       </dsp:style>
       <dsp:txBody>
-        <a:bodyPr spcFirstLastPara="0" vert="horz" wrap="square" lIns="10160" tIns="10160" rIns="10160" bIns="10160" numCol="1" spcCol="1270" anchor="ctr" anchorCtr="0">
+        <a:bodyPr spcFirstLastPara="0" vert="horz" wrap="square" lIns="12700" tIns="12700" rIns="12700" bIns="12700" numCol="1" spcCol="1270" anchor="ctr" anchorCtr="0">
           <a:noAutofit/>
         </a:bodyPr>
         <a:lstStyle/>
         <a:p>
-          <a:pPr marL="0" lvl="0" indent="0" algn="ctr" defTabSz="711200" rtl="0">
+          <a:pPr marL="0" lvl="0" indent="0" algn="ctr" defTabSz="889000" rtl="0">
             <a:lnSpc>
               <a:spcPct val="90000"/>
             </a:lnSpc>
@@ -1450,7 +1455,7 @@
             <a:buNone/>
           </a:pPr>
           <a:r>
-            <a:rPr lang="en-US" sz="1600" kern="1200" dirty="0">
+            <a:rPr lang="en-US" sz="2000" kern="1200" dirty="0">
               <a:solidFill>
                 <a:schemeClr val="tx1">
                   <a:lumMod val="50000"/>
@@ -1464,7 +1469,7 @@
           </a:r>
         </a:p>
         <a:p>
-          <a:pPr marL="0" lvl="0" indent="0" algn="ctr" defTabSz="711200" rtl="0">
+          <a:pPr marL="0" lvl="0" indent="0" algn="ctr" defTabSz="889000" rtl="0">
             <a:lnSpc>
               <a:spcPct val="90000"/>
             </a:lnSpc>
@@ -1477,7 +1482,7 @@
             <a:buNone/>
           </a:pPr>
           <a:r>
-            <a:rPr lang="en-US" sz="1600" kern="1200" dirty="0">
+            <a:rPr lang="en-US" sz="2000" kern="1200" dirty="0">
               <a:solidFill>
                 <a:schemeClr val="tx1">
                   <a:lumMod val="50000"/>
@@ -1491,7 +1496,7 @@
           </a:r>
         </a:p>
         <a:p>
-          <a:pPr marL="0" lvl="0" indent="0" algn="ctr" defTabSz="711200" rtl="0">
+          <a:pPr marL="0" lvl="0" indent="0" algn="ctr" defTabSz="889000" rtl="0">
             <a:lnSpc>
               <a:spcPct val="90000"/>
             </a:lnSpc>
@@ -1504,7 +1509,7 @@
             <a:buNone/>
           </a:pPr>
           <a:r>
-            <a:rPr lang="en-US" sz="1600" kern="1200" dirty="0">
+            <a:rPr lang="en-US" sz="2000" kern="1200" dirty="0">
               <a:solidFill>
                 <a:schemeClr val="tx1">
                   <a:lumMod val="50000"/>
@@ -1561,12 +1566,12 @@
         </a:fontRef>
       </dsp:style>
       <dsp:txBody>
-        <a:bodyPr spcFirstLastPara="0" vert="horz" wrap="square" lIns="10160" tIns="10160" rIns="10160" bIns="10160" numCol="1" spcCol="1270" anchor="ctr" anchorCtr="0">
+        <a:bodyPr spcFirstLastPara="0" vert="horz" wrap="square" lIns="12700" tIns="12700" rIns="12700" bIns="12700" numCol="1" spcCol="1270" anchor="ctr" anchorCtr="0">
           <a:noAutofit/>
         </a:bodyPr>
         <a:lstStyle/>
         <a:p>
-          <a:pPr marL="0" lvl="0" indent="0" algn="ctr" defTabSz="711200" rtl="0">
+          <a:pPr marL="0" lvl="0" indent="0" algn="ctr" defTabSz="889000" rtl="0">
             <a:lnSpc>
               <a:spcPct val="90000"/>
             </a:lnSpc>
@@ -1579,7 +1584,7 @@
             <a:buNone/>
           </a:pPr>
           <a:r>
-            <a:rPr lang="en-US" sz="1600" kern="1200" dirty="0">
+            <a:rPr lang="en-US" sz="2000" kern="1200" dirty="0">
               <a:solidFill>
                 <a:schemeClr val="tx1">
                   <a:lumMod val="50000"/>
@@ -1593,7 +1598,7 @@
           </a:r>
         </a:p>
         <a:p>
-          <a:pPr marL="0" lvl="0" indent="0" algn="ctr" defTabSz="711200" rtl="0">
+          <a:pPr marL="0" lvl="0" indent="0" algn="ctr" defTabSz="889000" rtl="0">
             <a:lnSpc>
               <a:spcPct val="90000"/>
             </a:lnSpc>
@@ -1606,7 +1611,7 @@
             <a:buNone/>
           </a:pPr>
           <a:r>
-            <a:rPr lang="en-US" sz="1600" kern="1200" dirty="0">
+            <a:rPr lang="en-US" sz="2000" kern="1200" dirty="0">
               <a:solidFill>
                 <a:schemeClr val="tx1">
                   <a:lumMod val="50000"/>
@@ -1663,12 +1668,12 @@
         </a:fontRef>
       </dsp:style>
       <dsp:txBody>
-        <a:bodyPr spcFirstLastPara="0" vert="horz" wrap="square" lIns="10160" tIns="10160" rIns="10160" bIns="10160" numCol="1" spcCol="1270" anchor="ctr" anchorCtr="0">
+        <a:bodyPr spcFirstLastPara="0" vert="horz" wrap="square" lIns="12700" tIns="12700" rIns="12700" bIns="12700" numCol="1" spcCol="1270" anchor="ctr" anchorCtr="0">
           <a:noAutofit/>
         </a:bodyPr>
         <a:lstStyle/>
         <a:p>
-          <a:pPr marL="0" lvl="0" indent="0" algn="ctr" defTabSz="711200">
+          <a:pPr marL="0" lvl="0" indent="0" algn="ctr" defTabSz="889000">
             <a:lnSpc>
               <a:spcPct val="90000"/>
             </a:lnSpc>
@@ -1681,7 +1686,7 @@
             <a:buNone/>
           </a:pPr>
           <a:r>
-            <a:rPr lang="en-US" sz="1600" kern="1200" dirty="0">
+            <a:rPr lang="en-US" sz="2000" kern="1200" dirty="0">
               <a:solidFill>
                 <a:schemeClr val="tx1">
                   <a:lumMod val="50000"/>
@@ -1695,7 +1700,7 @@
           </a:r>
         </a:p>
         <a:p>
-          <a:pPr marL="0" lvl="0" indent="0" algn="ctr" defTabSz="711200">
+          <a:pPr marL="0" lvl="0" indent="0" algn="ctr" defTabSz="889000">
             <a:lnSpc>
               <a:spcPct val="90000"/>
             </a:lnSpc>
@@ -1708,7 +1713,7 @@
             <a:buNone/>
           </a:pPr>
           <a:r>
-            <a:rPr lang="en-US" sz="1600" kern="1200" dirty="0">
+            <a:rPr lang="en-US" sz="2000" kern="1200" dirty="0">
               <a:solidFill>
                 <a:schemeClr val="tx1">
                   <a:lumMod val="50000"/>
@@ -1720,7 +1725,7 @@
             </a:rPr>
             <a:t>N = 13</a:t>
           </a:r>
-          <a:endParaRPr lang="en-US" sz="1600" kern="1200" dirty="0"/>
+          <a:endParaRPr lang="en-US" sz="2000" kern="1200" dirty="0"/>
         </a:p>
       </dsp:txBody>
       <dsp:txXfrm>
@@ -4059,7 +4064,7 @@
           <a:p>
             <a:fld id="{B5BF6319-5C48-7140-9CB8-BA61941814CE}" type="datetimeFigureOut">
               <a:rPr lang="en-US" smtClean="0"/>
-              <a:t>5/10/20</a:t>
+              <a:t>5/11/20</a:t>
             </a:fld>
             <a:endParaRPr lang="en-US"/>
           </a:p>
@@ -4257,7 +4262,7 @@
           <a:p>
             <a:fld id="{B5BF6319-5C48-7140-9CB8-BA61941814CE}" type="datetimeFigureOut">
               <a:rPr lang="en-US" smtClean="0"/>
-              <a:t>5/10/20</a:t>
+              <a:t>5/11/20</a:t>
             </a:fld>
             <a:endParaRPr lang="en-US"/>
           </a:p>
@@ -4465,7 +4470,7 @@
           <a:p>
             <a:fld id="{B5BF6319-5C48-7140-9CB8-BA61941814CE}" type="datetimeFigureOut">
               <a:rPr lang="en-US" smtClean="0"/>
-              <a:t>5/10/20</a:t>
+              <a:t>5/11/20</a:t>
             </a:fld>
             <a:endParaRPr lang="en-US"/>
           </a:p>
@@ -4663,7 +4668,7 @@
           <a:p>
             <a:fld id="{B5BF6319-5C48-7140-9CB8-BA61941814CE}" type="datetimeFigureOut">
               <a:rPr lang="en-US" smtClean="0"/>
-              <a:t>5/10/20</a:t>
+              <a:t>5/11/20</a:t>
             </a:fld>
             <a:endParaRPr lang="en-US"/>
           </a:p>
@@ -4938,7 +4943,7 @@
           <a:p>
             <a:fld id="{B5BF6319-5C48-7140-9CB8-BA61941814CE}" type="datetimeFigureOut">
               <a:rPr lang="en-US" smtClean="0"/>
-              <a:t>5/10/20</a:t>
+              <a:t>5/11/20</a:t>
             </a:fld>
             <a:endParaRPr lang="en-US"/>
           </a:p>
@@ -5203,7 +5208,7 @@
           <a:p>
             <a:fld id="{B5BF6319-5C48-7140-9CB8-BA61941814CE}" type="datetimeFigureOut">
               <a:rPr lang="en-US" smtClean="0"/>
-              <a:t>5/10/20</a:t>
+              <a:t>5/11/20</a:t>
             </a:fld>
             <a:endParaRPr lang="en-US"/>
           </a:p>
@@ -5615,7 +5620,7 @@
           <a:p>
             <a:fld id="{B5BF6319-5C48-7140-9CB8-BA61941814CE}" type="datetimeFigureOut">
               <a:rPr lang="en-US" smtClean="0"/>
-              <a:t>5/10/20</a:t>
+              <a:t>5/11/20</a:t>
             </a:fld>
             <a:endParaRPr lang="en-US"/>
           </a:p>
@@ -5756,7 +5761,7 @@
           <a:p>
             <a:fld id="{B5BF6319-5C48-7140-9CB8-BA61941814CE}" type="datetimeFigureOut">
               <a:rPr lang="en-US" smtClean="0"/>
-              <a:t>5/10/20</a:t>
+              <a:t>5/11/20</a:t>
             </a:fld>
             <a:endParaRPr lang="en-US"/>
           </a:p>
@@ -5869,7 +5874,7 @@
           <a:p>
             <a:fld id="{B5BF6319-5C48-7140-9CB8-BA61941814CE}" type="datetimeFigureOut">
               <a:rPr lang="en-US" smtClean="0"/>
-              <a:t>5/10/20</a:t>
+              <a:t>5/11/20</a:t>
             </a:fld>
             <a:endParaRPr lang="en-US"/>
           </a:p>
@@ -6180,7 +6185,7 @@
           <a:p>
             <a:fld id="{B5BF6319-5C48-7140-9CB8-BA61941814CE}" type="datetimeFigureOut">
               <a:rPr lang="en-US" smtClean="0"/>
-              <a:t>5/10/20</a:t>
+              <a:t>5/11/20</a:t>
             </a:fld>
             <a:endParaRPr lang="en-US"/>
           </a:p>
@@ -6468,7 +6473,7 @@
           <a:p>
             <a:fld id="{B5BF6319-5C48-7140-9CB8-BA61941814CE}" type="datetimeFigureOut">
               <a:rPr lang="en-US" smtClean="0"/>
-              <a:t>5/10/20</a:t>
+              <a:t>5/11/20</a:t>
             </a:fld>
             <a:endParaRPr lang="en-US"/>
           </a:p>
@@ -6709,7 +6714,7 @@
           <a:p>
             <a:fld id="{B5BF6319-5C48-7140-9CB8-BA61941814CE}" type="datetimeFigureOut">
               <a:rPr lang="en-US" smtClean="0"/>
-              <a:t>5/10/20</a:t>
+              <a:t>5/11/20</a:t>
             </a:fld>
             <a:endParaRPr lang="en-US"/>
           </a:p>
@@ -7139,7 +7144,7 @@
           <p:nvPr>
             <p:extLst>
               <p:ext uri="{D42A27DB-BD31-4B8C-83A1-F6EECF244321}">
-                <p14:modId xmlns:p14="http://schemas.microsoft.com/office/powerpoint/2010/main" val="3737005096"/>
+                <p14:modId xmlns:p14="http://schemas.microsoft.com/office/powerpoint/2010/main" val="689314039"/>
               </p:ext>
             </p:extLst>
           </p:nvPr>

</xml_diff>